<commit_message>
fixed links to Zep songs
</commit_message>
<xml_diff>
--- a/HSTR121/ppts/LedZep.pptx
+++ b/HSTR121/ppts/LedZep.pptx
@@ -159,10 +159,9 @@
           </a:lstStyle>
           <a:p>
             <a:r>
-              <a:rPr lang="en-US" smtClean="0"/>
+              <a:rPr lang="en-US"/>
               <a:t>Click to edit Master title style</a:t>
             </a:r>
-            <a:endParaRPr lang="en-US"/>
           </a:p>
         </p:txBody>
       </p:sp>
@@ -224,10 +223,9 @@
           </a:lstStyle>
           <a:p>
             <a:r>
-              <a:rPr lang="en-US" smtClean="0"/>
+              <a:rPr lang="en-US"/>
               <a:t>Click to edit Master subtitle style</a:t>
             </a:r>
-            <a:endParaRPr lang="en-US"/>
           </a:p>
         </p:txBody>
       </p:sp>
@@ -248,7 +246,7 @@
           <a:p>
             <a:fld id="{EDDF84C3-C653-4E47-8EBB-B788DF674C2F}" type="datetimeFigureOut">
               <a:rPr lang="en-US" smtClean="0"/>
-              <a:t>11/30/2015</a:t>
+              <a:t>3/13/18</a:t>
             </a:fld>
             <a:endParaRPr lang="en-US"/>
           </a:p>
@@ -342,10 +340,9 @@
           <a:lstStyle/>
           <a:p>
             <a:r>
-              <a:rPr lang="en-US" smtClean="0"/>
+              <a:rPr lang="en-US"/>
               <a:t>Click to edit Master title style</a:t>
             </a:r>
-            <a:endParaRPr lang="en-US"/>
           </a:p>
         </p:txBody>
       </p:sp>
@@ -366,38 +363,37 @@
           <a:p>
             <a:pPr lvl="0"/>
             <a:r>
-              <a:rPr lang="en-US" smtClean="0"/>
+              <a:rPr lang="en-US"/>
               <a:t>Click to edit Master text styles</a:t>
             </a:r>
           </a:p>
           <a:p>
             <a:pPr lvl="1"/>
             <a:r>
-              <a:rPr lang="en-US" smtClean="0"/>
+              <a:rPr lang="en-US"/>
               <a:t>Second level</a:t>
             </a:r>
           </a:p>
           <a:p>
             <a:pPr lvl="2"/>
             <a:r>
-              <a:rPr lang="en-US" smtClean="0"/>
+              <a:rPr lang="en-US"/>
               <a:t>Third level</a:t>
             </a:r>
           </a:p>
           <a:p>
             <a:pPr lvl="3"/>
             <a:r>
-              <a:rPr lang="en-US" smtClean="0"/>
+              <a:rPr lang="en-US"/>
               <a:t>Fourth level</a:t>
             </a:r>
           </a:p>
           <a:p>
             <a:pPr lvl="4"/>
             <a:r>
-              <a:rPr lang="en-US" smtClean="0"/>
+              <a:rPr lang="en-US"/>
               <a:t>Fifth level</a:t>
             </a:r>
-            <a:endParaRPr lang="en-US"/>
           </a:p>
         </p:txBody>
       </p:sp>
@@ -418,7 +414,7 @@
           <a:p>
             <a:fld id="{EDDF84C3-C653-4E47-8EBB-B788DF674C2F}" type="datetimeFigureOut">
               <a:rPr lang="en-US" smtClean="0"/>
-              <a:t>11/30/2015</a:t>
+              <a:t>3/13/18</a:t>
             </a:fld>
             <a:endParaRPr lang="en-US"/>
           </a:p>
@@ -517,10 +513,9 @@
           <a:lstStyle/>
           <a:p>
             <a:r>
-              <a:rPr lang="en-US" smtClean="0"/>
+              <a:rPr lang="en-US"/>
               <a:t>Click to edit Master title style</a:t>
             </a:r>
-            <a:endParaRPr lang="en-US"/>
           </a:p>
         </p:txBody>
       </p:sp>
@@ -546,38 +541,37 @@
           <a:p>
             <a:pPr lvl="0"/>
             <a:r>
-              <a:rPr lang="en-US" smtClean="0"/>
+              <a:rPr lang="en-US"/>
               <a:t>Click to edit Master text styles</a:t>
             </a:r>
           </a:p>
           <a:p>
             <a:pPr lvl="1"/>
             <a:r>
-              <a:rPr lang="en-US" smtClean="0"/>
+              <a:rPr lang="en-US"/>
               <a:t>Second level</a:t>
             </a:r>
           </a:p>
           <a:p>
             <a:pPr lvl="2"/>
             <a:r>
-              <a:rPr lang="en-US" smtClean="0"/>
+              <a:rPr lang="en-US"/>
               <a:t>Third level</a:t>
             </a:r>
           </a:p>
           <a:p>
             <a:pPr lvl="3"/>
             <a:r>
-              <a:rPr lang="en-US" smtClean="0"/>
+              <a:rPr lang="en-US"/>
               <a:t>Fourth level</a:t>
             </a:r>
           </a:p>
           <a:p>
             <a:pPr lvl="4"/>
             <a:r>
-              <a:rPr lang="en-US" smtClean="0"/>
+              <a:rPr lang="en-US"/>
               <a:t>Fifth level</a:t>
             </a:r>
-            <a:endParaRPr lang="en-US"/>
           </a:p>
         </p:txBody>
       </p:sp>
@@ -598,7 +592,7 @@
           <a:p>
             <a:fld id="{EDDF84C3-C653-4E47-8EBB-B788DF674C2F}" type="datetimeFigureOut">
               <a:rPr lang="en-US" smtClean="0"/>
-              <a:t>11/30/2015</a:t>
+              <a:t>3/13/18</a:t>
             </a:fld>
             <a:endParaRPr lang="en-US"/>
           </a:p>
@@ -692,10 +686,9 @@
           <a:lstStyle/>
           <a:p>
             <a:r>
-              <a:rPr lang="en-US" smtClean="0"/>
+              <a:rPr lang="en-US"/>
               <a:t>Click to edit Master title style</a:t>
             </a:r>
-            <a:endParaRPr lang="en-US"/>
           </a:p>
         </p:txBody>
       </p:sp>
@@ -716,38 +709,37 @@
           <a:p>
             <a:pPr lvl="0"/>
             <a:r>
-              <a:rPr lang="en-US" smtClean="0"/>
+              <a:rPr lang="en-US"/>
               <a:t>Click to edit Master text styles</a:t>
             </a:r>
           </a:p>
           <a:p>
             <a:pPr lvl="1"/>
             <a:r>
-              <a:rPr lang="en-US" smtClean="0"/>
+              <a:rPr lang="en-US"/>
               <a:t>Second level</a:t>
             </a:r>
           </a:p>
           <a:p>
             <a:pPr lvl="2"/>
             <a:r>
-              <a:rPr lang="en-US" smtClean="0"/>
+              <a:rPr lang="en-US"/>
               <a:t>Third level</a:t>
             </a:r>
           </a:p>
           <a:p>
             <a:pPr lvl="3"/>
             <a:r>
-              <a:rPr lang="en-US" smtClean="0"/>
+              <a:rPr lang="en-US"/>
               <a:t>Fourth level</a:t>
             </a:r>
           </a:p>
           <a:p>
             <a:pPr lvl="4"/>
             <a:r>
-              <a:rPr lang="en-US" smtClean="0"/>
+              <a:rPr lang="en-US"/>
               <a:t>Fifth level</a:t>
             </a:r>
-            <a:endParaRPr lang="en-US"/>
           </a:p>
         </p:txBody>
       </p:sp>
@@ -768,7 +760,7 @@
           <a:p>
             <a:fld id="{EDDF84C3-C653-4E47-8EBB-B788DF674C2F}" type="datetimeFigureOut">
               <a:rPr lang="en-US" smtClean="0"/>
-              <a:t>11/30/2015</a:t>
+              <a:t>3/13/18</a:t>
             </a:fld>
             <a:endParaRPr lang="en-US"/>
           </a:p>
@@ -871,10 +863,9 @@
           </a:lstStyle>
           <a:p>
             <a:r>
-              <a:rPr lang="en-US" smtClean="0"/>
+              <a:rPr lang="en-US"/>
               <a:t>Click to edit Master title style</a:t>
             </a:r>
-            <a:endParaRPr lang="en-US"/>
           </a:p>
         </p:txBody>
       </p:sp>
@@ -991,7 +982,7 @@
           <a:p>
             <a:pPr lvl="0"/>
             <a:r>
-              <a:rPr lang="en-US" smtClean="0"/>
+              <a:rPr lang="en-US"/>
               <a:t>Click to edit Master text styles</a:t>
             </a:r>
           </a:p>
@@ -1014,7 +1005,7 @@
           <a:p>
             <a:fld id="{EDDF84C3-C653-4E47-8EBB-B788DF674C2F}" type="datetimeFigureOut">
               <a:rPr lang="en-US" smtClean="0"/>
-              <a:t>11/30/2015</a:t>
+              <a:t>3/13/18</a:t>
             </a:fld>
             <a:endParaRPr lang="en-US"/>
           </a:p>
@@ -1108,10 +1099,9 @@
           <a:lstStyle/>
           <a:p>
             <a:r>
-              <a:rPr lang="en-US" smtClean="0"/>
+              <a:rPr lang="en-US"/>
               <a:t>Click to edit Master title style</a:t>
             </a:r>
-            <a:endParaRPr lang="en-US"/>
           </a:p>
         </p:txBody>
       </p:sp>
@@ -1137,38 +1127,37 @@
           <a:p>
             <a:pPr lvl="0"/>
             <a:r>
-              <a:rPr lang="en-US" smtClean="0"/>
+              <a:rPr lang="en-US"/>
               <a:t>Click to edit Master text styles</a:t>
             </a:r>
           </a:p>
           <a:p>
             <a:pPr lvl="1"/>
             <a:r>
-              <a:rPr lang="en-US" smtClean="0"/>
+              <a:rPr lang="en-US"/>
               <a:t>Second level</a:t>
             </a:r>
           </a:p>
           <a:p>
             <a:pPr lvl="2"/>
             <a:r>
-              <a:rPr lang="en-US" smtClean="0"/>
+              <a:rPr lang="en-US"/>
               <a:t>Third level</a:t>
             </a:r>
           </a:p>
           <a:p>
             <a:pPr lvl="3"/>
             <a:r>
-              <a:rPr lang="en-US" smtClean="0"/>
+              <a:rPr lang="en-US"/>
               <a:t>Fourth level</a:t>
             </a:r>
           </a:p>
           <a:p>
             <a:pPr lvl="4"/>
             <a:r>
-              <a:rPr lang="en-US" smtClean="0"/>
+              <a:rPr lang="en-US"/>
               <a:t>Fifth level</a:t>
             </a:r>
-            <a:endParaRPr lang="en-US"/>
           </a:p>
         </p:txBody>
       </p:sp>
@@ -1194,38 +1183,37 @@
           <a:p>
             <a:pPr lvl="0"/>
             <a:r>
-              <a:rPr lang="en-US" smtClean="0"/>
+              <a:rPr lang="en-US"/>
               <a:t>Click to edit Master text styles</a:t>
             </a:r>
           </a:p>
           <a:p>
             <a:pPr lvl="1"/>
             <a:r>
-              <a:rPr lang="en-US" smtClean="0"/>
+              <a:rPr lang="en-US"/>
               <a:t>Second level</a:t>
             </a:r>
           </a:p>
           <a:p>
             <a:pPr lvl="2"/>
             <a:r>
-              <a:rPr lang="en-US" smtClean="0"/>
+              <a:rPr lang="en-US"/>
               <a:t>Third level</a:t>
             </a:r>
           </a:p>
           <a:p>
             <a:pPr lvl="3"/>
             <a:r>
-              <a:rPr lang="en-US" smtClean="0"/>
+              <a:rPr lang="en-US"/>
               <a:t>Fourth level</a:t>
             </a:r>
           </a:p>
           <a:p>
             <a:pPr lvl="4"/>
             <a:r>
-              <a:rPr lang="en-US" smtClean="0"/>
+              <a:rPr lang="en-US"/>
               <a:t>Fifth level</a:t>
             </a:r>
-            <a:endParaRPr lang="en-US"/>
           </a:p>
         </p:txBody>
       </p:sp>
@@ -1246,7 +1234,7 @@
           <a:p>
             <a:fld id="{EDDF84C3-C653-4E47-8EBB-B788DF674C2F}" type="datetimeFigureOut">
               <a:rPr lang="en-US" smtClean="0"/>
-              <a:t>11/30/2015</a:t>
+              <a:t>3/13/18</a:t>
             </a:fld>
             <a:endParaRPr lang="en-US"/>
           </a:p>
@@ -1345,10 +1333,9 @@
           <a:lstStyle/>
           <a:p>
             <a:r>
-              <a:rPr lang="en-US" smtClean="0"/>
+              <a:rPr lang="en-US"/>
               <a:t>Click to edit Master title style</a:t>
             </a:r>
-            <a:endParaRPr lang="en-US"/>
           </a:p>
         </p:txBody>
       </p:sp>
@@ -1411,7 +1398,7 @@
           <a:p>
             <a:pPr lvl="0"/>
             <a:r>
-              <a:rPr lang="en-US" smtClean="0"/>
+              <a:rPr lang="en-US"/>
               <a:t>Click to edit Master text styles</a:t>
             </a:r>
           </a:p>
@@ -1439,38 +1426,37 @@
           <a:p>
             <a:pPr lvl="0"/>
             <a:r>
-              <a:rPr lang="en-US" smtClean="0"/>
+              <a:rPr lang="en-US"/>
               <a:t>Click to edit Master text styles</a:t>
             </a:r>
           </a:p>
           <a:p>
             <a:pPr lvl="1"/>
             <a:r>
-              <a:rPr lang="en-US" smtClean="0"/>
+              <a:rPr lang="en-US"/>
               <a:t>Second level</a:t>
             </a:r>
           </a:p>
           <a:p>
             <a:pPr lvl="2"/>
             <a:r>
-              <a:rPr lang="en-US" smtClean="0"/>
+              <a:rPr lang="en-US"/>
               <a:t>Third level</a:t>
             </a:r>
           </a:p>
           <a:p>
             <a:pPr lvl="3"/>
             <a:r>
-              <a:rPr lang="en-US" smtClean="0"/>
+              <a:rPr lang="en-US"/>
               <a:t>Fourth level</a:t>
             </a:r>
           </a:p>
           <a:p>
             <a:pPr lvl="4"/>
             <a:r>
-              <a:rPr lang="en-US" smtClean="0"/>
+              <a:rPr lang="en-US"/>
               <a:t>Fifth level</a:t>
             </a:r>
-            <a:endParaRPr lang="en-US"/>
           </a:p>
         </p:txBody>
       </p:sp>
@@ -1533,7 +1519,7 @@
           <a:p>
             <a:pPr lvl="0"/>
             <a:r>
-              <a:rPr lang="en-US" smtClean="0"/>
+              <a:rPr lang="en-US"/>
               <a:t>Click to edit Master text styles</a:t>
             </a:r>
           </a:p>
@@ -1561,38 +1547,37 @@
           <a:p>
             <a:pPr lvl="0"/>
             <a:r>
-              <a:rPr lang="en-US" smtClean="0"/>
+              <a:rPr lang="en-US"/>
               <a:t>Click to edit Master text styles</a:t>
             </a:r>
           </a:p>
           <a:p>
             <a:pPr lvl="1"/>
             <a:r>
-              <a:rPr lang="en-US" smtClean="0"/>
+              <a:rPr lang="en-US"/>
               <a:t>Second level</a:t>
             </a:r>
           </a:p>
           <a:p>
             <a:pPr lvl="2"/>
             <a:r>
-              <a:rPr lang="en-US" smtClean="0"/>
+              <a:rPr lang="en-US"/>
               <a:t>Third level</a:t>
             </a:r>
           </a:p>
           <a:p>
             <a:pPr lvl="3"/>
             <a:r>
-              <a:rPr lang="en-US" smtClean="0"/>
+              <a:rPr lang="en-US"/>
               <a:t>Fourth level</a:t>
             </a:r>
           </a:p>
           <a:p>
             <a:pPr lvl="4"/>
             <a:r>
-              <a:rPr lang="en-US" smtClean="0"/>
+              <a:rPr lang="en-US"/>
               <a:t>Fifth level</a:t>
             </a:r>
-            <a:endParaRPr lang="en-US"/>
           </a:p>
         </p:txBody>
       </p:sp>
@@ -1613,7 +1598,7 @@
           <a:p>
             <a:fld id="{EDDF84C3-C653-4E47-8EBB-B788DF674C2F}" type="datetimeFigureOut">
               <a:rPr lang="en-US" smtClean="0"/>
-              <a:t>11/30/2015</a:t>
+              <a:t>3/13/18</a:t>
             </a:fld>
             <a:endParaRPr lang="en-US"/>
           </a:p>
@@ -1707,10 +1692,9 @@
           <a:lstStyle/>
           <a:p>
             <a:r>
-              <a:rPr lang="en-US" smtClean="0"/>
+              <a:rPr lang="en-US"/>
               <a:t>Click to edit Master title style</a:t>
             </a:r>
-            <a:endParaRPr lang="en-US"/>
           </a:p>
         </p:txBody>
       </p:sp>
@@ -1731,7 +1715,7 @@
           <a:p>
             <a:fld id="{EDDF84C3-C653-4E47-8EBB-B788DF674C2F}" type="datetimeFigureOut">
               <a:rPr lang="en-US" smtClean="0"/>
-              <a:t>11/30/2015</a:t>
+              <a:t>3/13/18</a:t>
             </a:fld>
             <a:endParaRPr lang="en-US"/>
           </a:p>
@@ -1826,7 +1810,7 @@
           <a:p>
             <a:fld id="{EDDF84C3-C653-4E47-8EBB-B788DF674C2F}" type="datetimeFigureOut">
               <a:rPr lang="en-US" smtClean="0"/>
-              <a:t>11/30/2015</a:t>
+              <a:t>3/13/18</a:t>
             </a:fld>
             <a:endParaRPr lang="en-US"/>
           </a:p>
@@ -1929,10 +1913,9 @@
           </a:lstStyle>
           <a:p>
             <a:r>
-              <a:rPr lang="en-US" smtClean="0"/>
+              <a:rPr lang="en-US"/>
               <a:t>Click to edit Master title style</a:t>
             </a:r>
-            <a:endParaRPr lang="en-US"/>
           </a:p>
         </p:txBody>
       </p:sp>
@@ -1986,38 +1969,37 @@
           <a:p>
             <a:pPr lvl="0"/>
             <a:r>
-              <a:rPr lang="en-US" smtClean="0"/>
+              <a:rPr lang="en-US"/>
               <a:t>Click to edit Master text styles</a:t>
             </a:r>
           </a:p>
           <a:p>
             <a:pPr lvl="1"/>
             <a:r>
-              <a:rPr lang="en-US" smtClean="0"/>
+              <a:rPr lang="en-US"/>
               <a:t>Second level</a:t>
             </a:r>
           </a:p>
           <a:p>
             <a:pPr lvl="2"/>
             <a:r>
-              <a:rPr lang="en-US" smtClean="0"/>
+              <a:rPr lang="en-US"/>
               <a:t>Third level</a:t>
             </a:r>
           </a:p>
           <a:p>
             <a:pPr lvl="3"/>
             <a:r>
-              <a:rPr lang="en-US" smtClean="0"/>
+              <a:rPr lang="en-US"/>
               <a:t>Fourth level</a:t>
             </a:r>
           </a:p>
           <a:p>
             <a:pPr lvl="4"/>
             <a:r>
-              <a:rPr lang="en-US" smtClean="0"/>
+              <a:rPr lang="en-US"/>
               <a:t>Fifth level</a:t>
             </a:r>
-            <a:endParaRPr lang="en-US"/>
           </a:p>
         </p:txBody>
       </p:sp>
@@ -2080,7 +2062,7 @@
           <a:p>
             <a:pPr lvl="0"/>
             <a:r>
-              <a:rPr lang="en-US" smtClean="0"/>
+              <a:rPr lang="en-US"/>
               <a:t>Click to edit Master text styles</a:t>
             </a:r>
           </a:p>
@@ -2103,7 +2085,7 @@
           <a:p>
             <a:fld id="{EDDF84C3-C653-4E47-8EBB-B788DF674C2F}" type="datetimeFigureOut">
               <a:rPr lang="en-US" smtClean="0"/>
-              <a:t>11/30/2015</a:t>
+              <a:t>3/13/18</a:t>
             </a:fld>
             <a:endParaRPr lang="en-US"/>
           </a:p>
@@ -2206,10 +2188,9 @@
           </a:lstStyle>
           <a:p>
             <a:r>
-              <a:rPr lang="en-US" smtClean="0"/>
+              <a:rPr lang="en-US"/>
               <a:t>Click to edit Master title style</a:t>
             </a:r>
-            <a:endParaRPr lang="en-US"/>
           </a:p>
         </p:txBody>
       </p:sp>
@@ -2333,7 +2314,7 @@
           <a:p>
             <a:pPr lvl="0"/>
             <a:r>
-              <a:rPr lang="en-US" smtClean="0"/>
+              <a:rPr lang="en-US"/>
               <a:t>Click to edit Master text styles</a:t>
             </a:r>
           </a:p>
@@ -2356,7 +2337,7 @@
           <a:p>
             <a:fld id="{EDDF84C3-C653-4E47-8EBB-B788DF674C2F}" type="datetimeFigureOut">
               <a:rPr lang="en-US" smtClean="0"/>
-              <a:t>11/30/2015</a:t>
+              <a:t>3/13/18</a:t>
             </a:fld>
             <a:endParaRPr lang="en-US"/>
           </a:p>
@@ -2475,10 +2456,9 @@
           <a:lstStyle/>
           <a:p>
             <a:r>
-              <a:rPr lang="en-US" smtClean="0"/>
+              <a:rPr lang="en-US"/>
               <a:t>Click to edit Master title style</a:t>
             </a:r>
-            <a:endParaRPr lang="en-US"/>
           </a:p>
         </p:txBody>
       </p:sp>
@@ -2509,38 +2489,37 @@
           <a:p>
             <a:pPr lvl="0"/>
             <a:r>
-              <a:rPr lang="en-US" smtClean="0"/>
+              <a:rPr lang="en-US"/>
               <a:t>Click to edit Master text styles</a:t>
             </a:r>
           </a:p>
           <a:p>
             <a:pPr lvl="1"/>
             <a:r>
-              <a:rPr lang="en-US" smtClean="0"/>
+              <a:rPr lang="en-US"/>
               <a:t>Second level</a:t>
             </a:r>
           </a:p>
           <a:p>
             <a:pPr lvl="2"/>
             <a:r>
-              <a:rPr lang="en-US" smtClean="0"/>
+              <a:rPr lang="en-US"/>
               <a:t>Third level</a:t>
             </a:r>
           </a:p>
           <a:p>
             <a:pPr lvl="3"/>
             <a:r>
-              <a:rPr lang="en-US" smtClean="0"/>
+              <a:rPr lang="en-US"/>
               <a:t>Fourth level</a:t>
             </a:r>
           </a:p>
           <a:p>
             <a:pPr lvl="4"/>
             <a:r>
-              <a:rPr lang="en-US" smtClean="0"/>
+              <a:rPr lang="en-US"/>
               <a:t>Fifth level</a:t>
             </a:r>
-            <a:endParaRPr lang="en-US"/>
           </a:p>
         </p:txBody>
       </p:sp>
@@ -2579,7 +2558,7 @@
           <a:p>
             <a:fld id="{EDDF84C3-C653-4E47-8EBB-B788DF674C2F}" type="datetimeFigureOut">
               <a:rPr lang="en-US" smtClean="0"/>
-              <a:t>11/30/2015</a:t>
+              <a:t>3/13/18</a:t>
             </a:fld>
             <a:endParaRPr lang="en-US"/>
           </a:p>
@@ -3011,10 +2990,9 @@
           <a:lstStyle/>
           <a:p>
             <a:r>
-              <a:rPr lang="en-US" dirty="0" smtClean="0"/>
+              <a:rPr lang="en-US" dirty="0"/>
               <a:t> </a:t>
             </a:r>
-            <a:endParaRPr lang="en-US" dirty="0"/>
           </a:p>
         </p:txBody>
       </p:sp>
@@ -3063,7 +3041,7 @@
           <a:p>
             <a:pPr algn="ctr"/>
             <a:r>
-              <a:rPr lang="en-US" sz="5400" dirty="0" smtClean="0">
+              <a:rPr lang="en-US" sz="5400" dirty="0">
                 <a:solidFill>
                   <a:schemeClr val="tx1"/>
                 </a:solidFill>
@@ -3072,13 +3050,6 @@
               </a:rPr>
               <a:t>The 1970s Rock and Roll Band</a:t>
             </a:r>
-            <a:endParaRPr lang="en-US" sz="5400" dirty="0">
-              <a:solidFill>
-                <a:schemeClr val="tx1"/>
-              </a:solidFill>
-              <a:latin typeface="Andalus" panose="02020603050405020304" pitchFamily="18" charset="-78"/>
-              <a:cs typeface="Andalus" panose="02020603050405020304" pitchFamily="18" charset="-78"/>
-            </a:endParaRPr>
           </a:p>
         </p:txBody>
       </p:sp>
@@ -3092,13 +3063,6 @@
   <p:clrMapOvr>
     <a:masterClrMapping/>
   </p:clrMapOvr>
-  <p:timing>
-    <p:tnLst>
-      <p:par>
-        <p:cTn id="1" dur="indefinite" restart="never" nodeType="tmRoot"/>
-      </p:par>
-    </p:tnLst>
-  </p:timing>
 </p:sld>
 </file>
 
@@ -3135,18 +3099,17 @@
           <a:lstStyle/>
           <a:p>
             <a:r>
-              <a:rPr lang="en-US" b="1" dirty="0" smtClean="0"/>
+              <a:rPr lang="en-US" b="1" dirty="0"/>
               <a:t>The “New </a:t>
             </a:r>
             <a:r>
-              <a:rPr lang="en-US" b="1" dirty="0" err="1" smtClean="0"/>
+              <a:rPr lang="en-US" b="1" dirty="0" err="1"/>
               <a:t>Yardbirds</a:t>
             </a:r>
             <a:r>
-              <a:rPr lang="en-US" b="1" dirty="0" smtClean="0"/>
+              <a:rPr lang="en-US" b="1" dirty="0"/>
               <a:t>” became “Led Zeppelin”, 1968</a:t>
             </a:r>
-            <a:endParaRPr lang="en-US" b="1" dirty="0"/>
           </a:p>
         </p:txBody>
       </p:sp>
@@ -3166,48 +3129,47 @@
           <a:lstStyle/>
           <a:p>
             <a:r>
-              <a:rPr lang="en-US" dirty="0" smtClean="0"/>
+              <a:rPr lang="en-US" dirty="0"/>
               <a:t>Toured instead of real band.</a:t>
             </a:r>
           </a:p>
           <a:p>
             <a:r>
-              <a:rPr lang="en-US" dirty="0" smtClean="0"/>
+              <a:rPr lang="en-US" dirty="0"/>
               <a:t>Jimmy Page (studio musician) recruited Robert Plant, who suggested drummer John Bonham.</a:t>
             </a:r>
           </a:p>
           <a:p>
             <a:r>
-              <a:rPr lang="en-US" dirty="0" smtClean="0"/>
+              <a:rPr lang="en-US" dirty="0"/>
               <a:t>John Paul Jones applied to become bassist.</a:t>
             </a:r>
           </a:p>
           <a:p>
             <a:r>
-              <a:rPr lang="en-US" dirty="0" smtClean="0"/>
+              <a:rPr lang="en-US" dirty="0"/>
               <a:t>Keith Moon and John </a:t>
             </a:r>
             <a:r>
-              <a:rPr lang="en-US" dirty="0" err="1" smtClean="0"/>
+              <a:rPr lang="en-US" dirty="0" err="1"/>
               <a:t>Entwistle</a:t>
             </a:r>
             <a:r>
-              <a:rPr lang="en-US" dirty="0" smtClean="0"/>
+              <a:rPr lang="en-US" dirty="0"/>
               <a:t> suggested "Lead Balloon".</a:t>
             </a:r>
           </a:p>
           <a:p>
             <a:r>
-              <a:rPr lang="en-US" dirty="0" smtClean="0"/>
+              <a:rPr lang="en-US" dirty="0"/>
               <a:t>New manager, Peter Grant, suggested "Led Zeppelin".</a:t>
             </a:r>
           </a:p>
           <a:p>
             <a:r>
-              <a:rPr lang="en-US" dirty="0" smtClean="0"/>
+              <a:rPr lang="en-US" dirty="0"/>
               <a:t>Nov. 1968, Grant obtained a $143,000 deal with Atlantic Records, not having heard them yet: got tons of autonomy.</a:t>
             </a:r>
-            <a:endParaRPr lang="en-US" dirty="0"/>
           </a:p>
         </p:txBody>
       </p:sp>
@@ -3221,13 +3183,6 @@
   <p:clrMapOvr>
     <a:masterClrMapping/>
   </p:clrMapOvr>
-  <p:timing>
-    <p:tnLst>
-      <p:par>
-        <p:cTn id="1" dur="indefinite" restart="never" nodeType="tmRoot"/>
-      </p:par>
-    </p:tnLst>
-  </p:timing>
 </p:sld>
 </file>
 
@@ -3266,16 +3221,12 @@
           <a:lstStyle/>
           <a:p>
             <a:r>
-              <a:rPr lang="en-US" sz="4800" b="1" dirty="0" smtClean="0">
+              <a:rPr lang="en-US" sz="4800" b="1" dirty="0">
                 <a:latin typeface="Aharoni" panose="02010803020104030203" pitchFamily="2" charset="-79"/>
                 <a:cs typeface="Aharoni" panose="02010803020104030203" pitchFamily="2" charset="-79"/>
               </a:rPr>
               <a:t>Four Albums in Three Years!</a:t>
             </a:r>
-            <a:endParaRPr lang="en-US" sz="4800" b="1" dirty="0">
-              <a:latin typeface="Aharoni" panose="02010803020104030203" pitchFamily="2" charset="-79"/>
-              <a:cs typeface="Aharoni" panose="02010803020104030203" pitchFamily="2" charset="-79"/>
-            </a:endParaRPr>
           </a:p>
         </p:txBody>
       </p:sp>
@@ -3300,33 +3251,25 @@
           <a:lstStyle/>
           <a:p>
             <a:r>
-              <a:rPr lang="en-US" i="1" dirty="0" smtClean="0"/>
+              <a:rPr lang="en-US" i="1" dirty="0"/>
               <a:t>Led Zeppelin I </a:t>
             </a:r>
             <a:r>
-              <a:rPr lang="en-US" dirty="0" smtClean="0"/>
+              <a:rPr lang="en-US" dirty="0"/>
               <a:t>(1969): </a:t>
             </a:r>
           </a:p>
           <a:p>
             <a:pPr lvl="1"/>
             <a:r>
-              <a:rPr lang="en-US" dirty="0" smtClean="0"/>
-              <a:t>"</a:t>
-            </a:r>
-            <a:r>
-              <a:rPr lang="en-US" dirty="0"/>
-              <a:t>Dazed and Confused</a:t>
-            </a:r>
-            <a:r>
-              <a:rPr lang="en-US" dirty="0" smtClean="0"/>
-              <a:t>“</a:t>
+              <a:rPr lang="en-US" dirty="0"/>
+              <a:t>"Dazed and Confused“</a:t>
             </a:r>
           </a:p>
           <a:p>
             <a:pPr lvl="1"/>
             <a:r>
-              <a:rPr lang="en-US" dirty="0" smtClean="0"/>
+              <a:rPr lang="en-US" dirty="0"/>
               <a:t>"Good Times, Bad Times“</a:t>
             </a:r>
           </a:p>
@@ -3336,88 +3279,78 @@
               <a:rPr lang="en-US" dirty="0">
                 <a:hlinkClick r:id="rId2"/>
               </a:rPr>
+              <a:t>https://www.youtube.com/watch?v=1ppjI6KZHlE</a:t>
+            </a:r>
+            <a:endParaRPr lang="en-US" dirty="0"/>
+          </a:p>
+          <a:p>
+            <a:r>
+              <a:rPr lang="en-US" i="1" dirty="0"/>
+              <a:t>Led Zeppelin II </a:t>
+            </a:r>
+            <a:r>
+              <a:rPr lang="en-US" dirty="0"/>
+              <a:t>(1969): </a:t>
+            </a:r>
+          </a:p>
+          <a:p>
+            <a:pPr lvl="1"/>
+            <a:r>
+              <a:rPr lang="en-US" dirty="0"/>
+              <a:t>"Whole </a:t>
+            </a:r>
+            <a:r>
+              <a:rPr lang="en-US" dirty="0" err="1"/>
+              <a:t>Lotta</a:t>
+            </a:r>
+            <a:r>
+              <a:rPr lang="en-US" dirty="0"/>
+              <a:t> Love" </a:t>
+            </a:r>
+          </a:p>
+          <a:p>
+            <a:pPr lvl="1"/>
+            <a:r>
+              <a:rPr lang="en-US" dirty="0"/>
+              <a:t>"The Lemon Song" </a:t>
+            </a:r>
+          </a:p>
+          <a:p>
+            <a:pPr lvl="1"/>
+            <a:r>
+              <a:rPr lang="en-US" dirty="0"/>
+              <a:t>"Heartbreaker" </a:t>
+            </a:r>
+          </a:p>
+          <a:p>
+            <a:pPr lvl="1"/>
+            <a:r>
+              <a:rPr lang="en-US" dirty="0"/>
+              <a:t>"Ramble On“</a:t>
+            </a:r>
+          </a:p>
+          <a:p>
+            <a:pPr lvl="1"/>
+            <a:r>
+              <a:rPr lang="en-US" dirty="0"/>
               <a:t>https://</a:t>
             </a:r>
             <a:r>
-              <a:rPr lang="en-US" dirty="0" smtClean="0">
-                <a:hlinkClick r:id="rId2"/>
-              </a:rPr>
-              <a:t>www.youtube.com/watch?v=1ppjI6KZHlE</a:t>
-            </a:r>
-            <a:endParaRPr lang="en-US" dirty="0" smtClean="0"/>
-          </a:p>
-          <a:p>
-            <a:r>
-              <a:rPr lang="en-US" i="1" dirty="0" smtClean="0"/>
-              <a:t>Led Zeppelin II </a:t>
-            </a:r>
-            <a:r>
-              <a:rPr lang="en-US" dirty="0" smtClean="0"/>
-              <a:t>(</a:t>
-            </a:r>
-            <a:r>
-              <a:rPr lang="en-US" dirty="0" smtClean="0"/>
-              <a:t>1969): </a:t>
-            </a:r>
-            <a:endParaRPr lang="en-US" dirty="0" smtClean="0"/>
-          </a:p>
-          <a:p>
-            <a:pPr lvl="1"/>
-            <a:r>
-              <a:rPr lang="en-US" dirty="0" smtClean="0"/>
-              <a:t>"Whole </a:t>
-            </a:r>
-            <a:r>
-              <a:rPr lang="en-US" dirty="0" err="1" smtClean="0"/>
-              <a:t>Lotta</a:t>
-            </a:r>
-            <a:r>
-              <a:rPr lang="en-US" dirty="0" smtClean="0"/>
-              <a:t> Love" </a:t>
-            </a:r>
-          </a:p>
-          <a:p>
-            <a:pPr lvl="1"/>
-            <a:r>
-              <a:rPr lang="en-US" dirty="0" smtClean="0"/>
-              <a:t>"The Lemon Song" </a:t>
-            </a:r>
-          </a:p>
-          <a:p>
-            <a:pPr lvl="1"/>
-            <a:r>
-              <a:rPr lang="en-US" dirty="0" smtClean="0"/>
-              <a:t>"Heartbreaker" </a:t>
-            </a:r>
-          </a:p>
-          <a:p>
-            <a:pPr lvl="1"/>
-            <a:r>
-              <a:rPr lang="en-US" dirty="0" smtClean="0"/>
-              <a:t>"Ramble On“</a:t>
-            </a:r>
-          </a:p>
-          <a:p>
-            <a:pPr lvl="1"/>
-            <a:r>
-              <a:rPr lang="en-US" dirty="0">
-                <a:hlinkClick r:id="rId3"/>
-              </a:rPr>
-              <a:t>https://</a:t>
-            </a:r>
-            <a:r>
-              <a:rPr lang="en-US" dirty="0" smtClean="0">
-                <a:hlinkClick r:id="rId3"/>
-              </a:rPr>
-              <a:t>www.youtube.com/watch?v=gvQ2oKSLIGQ</a:t>
-            </a:r>
-            <a:endParaRPr lang="en-US" dirty="0" smtClean="0"/>
-          </a:p>
-          <a:p>
-            <a:pPr marL="457200" lvl="1" indent="0">
-              <a:buNone/>
-            </a:pPr>
-            <a:endParaRPr lang="en-US" dirty="0" smtClean="0"/>
+              <a:rPr lang="en-US" dirty="0" err="1"/>
+              <a:t>www.youtube.com</a:t>
+            </a:r>
+            <a:r>
+              <a:rPr lang="en-US" dirty="0"/>
+              <a:t>/</a:t>
+            </a:r>
+            <a:r>
+              <a:rPr lang="en-US" dirty="0" err="1"/>
+              <a:t>watch?v</a:t>
+            </a:r>
+            <a:r>
+              <a:rPr lang="en-US" dirty="0"/>
+              <a:t>=2bgKb45DBG0</a:t>
+            </a:r>
           </a:p>
           <a:p>
             <a:pPr marL="0" indent="0">
@@ -3436,7 +3369,7 @@
           <p:nvPr/>
         </p:nvPicPr>
         <p:blipFill>
-          <a:blip r:embed="rId4">
+          <a:blip r:embed="rId3">
             <a:extLst>
               <a:ext uri="{28A0092B-C50C-407E-A947-70E740481C1C}">
                 <a14:useLocalDpi xmlns:a14="http://schemas.microsoft.com/office/drawing/2010/main" val="0"/>
@@ -3467,13 +3400,6 @@
   <p:clrMapOvr>
     <a:masterClrMapping/>
   </p:clrMapOvr>
-  <p:timing>
-    <p:tnLst>
-      <p:par>
-        <p:cTn id="1" dur="indefinite" restart="never" nodeType="tmRoot"/>
-      </p:par>
-    </p:tnLst>
-  </p:timing>
 </p:sld>
 </file>
 
@@ -3512,16 +3438,12 @@
           <a:lstStyle/>
           <a:p>
             <a:r>
-              <a:rPr lang="en-US" sz="4800" b="1" dirty="0" smtClean="0">
+              <a:rPr lang="en-US" sz="4800" b="1" dirty="0">
                 <a:latin typeface="Aharoni" panose="02010803020104030203" pitchFamily="2" charset="-79"/>
                 <a:cs typeface="Aharoni" panose="02010803020104030203" pitchFamily="2" charset="-79"/>
               </a:rPr>
               <a:t>Four Albums in Three Years!</a:t>
             </a:r>
-            <a:endParaRPr lang="en-US" sz="4800" b="1" dirty="0">
-              <a:latin typeface="Aharoni" panose="02010803020104030203" pitchFamily="2" charset="-79"/>
-              <a:cs typeface="Aharoni" panose="02010803020104030203" pitchFamily="2" charset="-79"/>
-            </a:endParaRPr>
           </a:p>
         </p:txBody>
       </p:sp>
@@ -3548,18 +3470,18 @@
           <a:lstStyle/>
           <a:p>
             <a:r>
-              <a:rPr lang="en-US" i="1" dirty="0" smtClean="0"/>
+              <a:rPr lang="en-US" i="1" dirty="0"/>
               <a:t>Led Zeppelin III </a:t>
             </a:r>
             <a:r>
-              <a:rPr lang="en-US" dirty="0" smtClean="0"/>
+              <a:rPr lang="en-US" dirty="0"/>
               <a:t>(1970): </a:t>
             </a:r>
           </a:p>
           <a:p>
             <a:pPr lvl="1"/>
             <a:r>
-              <a:rPr lang="en-US" dirty="0" smtClean="0"/>
+              <a:rPr lang="en-US" dirty="0"/>
               <a:t>"Immigrant  Song" </a:t>
             </a:r>
           </a:p>
@@ -3569,51 +3491,45 @@
               <a:rPr lang="en-US" dirty="0">
                 <a:hlinkClick r:id="rId2"/>
               </a:rPr>
-              <a:t>https://</a:t>
-            </a:r>
-            <a:r>
-              <a:rPr lang="en-US" dirty="0" smtClean="0">
-                <a:hlinkClick r:id="rId2"/>
-              </a:rPr>
-              <a:t>www.youtube.com/watch?v=hC-T0rC6m7I</a:t>
-            </a:r>
-            <a:endParaRPr lang="en-US" dirty="0" smtClean="0"/>
+              <a:t>https://www.youtube.com/watch?v=F7cfiSa2xXo</a:t>
+            </a:r>
+            <a:endParaRPr lang="en-US" dirty="0"/>
           </a:p>
           <a:p>
             <a:pPr lvl="1"/>
             <a:r>
-              <a:rPr lang="en-US" dirty="0" smtClean="0"/>
+              <a:rPr lang="en-US" dirty="0"/>
               <a:t>"Since I’ve Been Loving you" </a:t>
             </a:r>
           </a:p>
           <a:p>
             <a:pPr lvl="1"/>
             <a:r>
-              <a:rPr lang="en-US" dirty="0" smtClean="0"/>
+              <a:rPr lang="en-US" dirty="0"/>
               <a:t>"Tangerine"</a:t>
             </a:r>
           </a:p>
           <a:p>
             <a:r>
-              <a:rPr lang="en-US" i="1" dirty="0" smtClean="0"/>
+              <a:rPr lang="en-US" i="1" dirty="0"/>
               <a:t>Led Zeppelin IV </a:t>
             </a:r>
             <a:r>
-              <a:rPr lang="en-US" dirty="0" smtClean="0"/>
+              <a:rPr lang="en-US" dirty="0"/>
               <a:t>(1971; no title, actually): </a:t>
             </a:r>
           </a:p>
           <a:p>
             <a:pPr lvl="1"/>
             <a:r>
-              <a:rPr lang="en-US" dirty="0" smtClean="0"/>
+              <a:rPr lang="en-US" dirty="0"/>
               <a:t>"Black Dog" </a:t>
             </a:r>
           </a:p>
           <a:p>
             <a:pPr lvl="1"/>
             <a:r>
-              <a:rPr lang="en-US" dirty="0" smtClean="0"/>
+              <a:rPr lang="en-US" dirty="0"/>
               <a:t>"Rock and Roll“</a:t>
             </a:r>
           </a:p>
@@ -3623,27 +3539,21 @@
               <a:rPr lang="en-US" dirty="0">
                 <a:hlinkClick r:id="rId3"/>
               </a:rPr>
-              <a:t>https://</a:t>
-            </a:r>
-            <a:r>
-              <a:rPr lang="en-US" dirty="0" smtClean="0">
-                <a:hlinkClick r:id="rId3"/>
-              </a:rPr>
-              <a:t>www.youtube.com/watch?v=mwFqRB2FQu4</a:t>
-            </a:r>
-            <a:endParaRPr lang="en-US" dirty="0" smtClean="0"/>
+              <a:t>https://www.youtube.com/watch?v=mwFqRB2FQu4</a:t>
+            </a:r>
+            <a:endParaRPr lang="en-US" dirty="0"/>
           </a:p>
           <a:p>
             <a:pPr lvl="1"/>
             <a:r>
-              <a:rPr lang="en-US" dirty="0" smtClean="0"/>
+              <a:rPr lang="en-US" dirty="0"/>
               <a:t>"Stairway to Heaven" </a:t>
             </a:r>
           </a:p>
           <a:p>
             <a:pPr lvl="1"/>
             <a:r>
-              <a:rPr lang="en-US" dirty="0" smtClean="0"/>
+              <a:rPr lang="en-US" dirty="0"/>
               <a:t>"Going to California"</a:t>
             </a:r>
           </a:p>
@@ -3692,13 +3602,6 @@
   <p:clrMapOvr>
     <a:masterClrMapping/>
   </p:clrMapOvr>
-  <p:timing>
-    <p:tnLst>
-      <p:par>
-        <p:cTn id="1" dur="indefinite" restart="never" nodeType="tmRoot"/>
-      </p:par>
-    </p:tnLst>
-  </p:timing>
 </p:sld>
 </file>
 
@@ -3740,14 +3643,11 @@
           <a:lstStyle/>
           <a:p>
             <a:r>
-              <a:rPr lang="en-US" b="1" dirty="0" smtClean="0">
+              <a:rPr lang="en-US" b="1" dirty="0">
                 <a:latin typeface="Algerian" panose="04020705040A02060702" pitchFamily="82" charset="0"/>
               </a:rPr>
               <a:t>Later work</a:t>
             </a:r>
-            <a:endParaRPr lang="en-US" b="1" dirty="0">
-              <a:latin typeface="Algerian" panose="04020705040A02060702" pitchFamily="82" charset="0"/>
-            </a:endParaRPr>
           </a:p>
         </p:txBody>
       </p:sp>
@@ -3774,80 +3674,51 @@
           <a:lstStyle/>
           <a:p>
             <a:r>
-              <a:rPr lang="en-US" i="1" dirty="0" smtClean="0"/>
-              <a:t>Houses </a:t>
-            </a:r>
-            <a:r>
               <a:rPr lang="en-US" i="1" dirty="0"/>
-              <a:t>of the Holy </a:t>
+              <a:t>Houses of the Holy </a:t>
             </a:r>
             <a:r>
               <a:rPr lang="en-US" dirty="0"/>
               <a:t>(1973): </a:t>
             </a:r>
-            <a:endParaRPr lang="en-US" dirty="0" smtClean="0"/>
           </a:p>
           <a:p>
             <a:pPr lvl="1"/>
             <a:r>
-              <a:rPr lang="en-US" dirty="0" smtClean="0"/>
+              <a:rPr lang="en-US" dirty="0"/>
               <a:t>First with only originally composed </a:t>
             </a:r>
             <a:r>
-              <a:rPr lang="en-US" dirty="0" err="1" smtClean="0"/>
+              <a:rPr lang="en-US" dirty="0" err="1"/>
               <a:t>musics</a:t>
             </a:r>
-            <a:endParaRPr lang="en-US" dirty="0" smtClean="0"/>
+            <a:endParaRPr lang="en-US" dirty="0"/>
           </a:p>
           <a:p>
             <a:pPr lvl="1"/>
             <a:r>
-              <a:rPr lang="en-US" dirty="0" smtClean="0"/>
-              <a:t>"</a:t>
-            </a:r>
-            <a:r>
-              <a:rPr lang="en-US" dirty="0"/>
-              <a:t>The Song Remains the </a:t>
-            </a:r>
-            <a:r>
-              <a:rPr lang="en-US" dirty="0" smtClean="0"/>
-              <a:t>Same" </a:t>
+              <a:rPr lang="en-US" dirty="0"/>
+              <a:t>"The Song Remains the Same" </a:t>
             </a:r>
           </a:p>
           <a:p>
             <a:pPr lvl="1"/>
             <a:r>
-              <a:rPr lang="en-US" dirty="0" smtClean="0"/>
-              <a:t>"</a:t>
-            </a:r>
-            <a:r>
-              <a:rPr lang="en-US" dirty="0"/>
-              <a:t>The Rain Song," "No </a:t>
-            </a:r>
-            <a:r>
-              <a:rPr lang="en-US" dirty="0" smtClean="0"/>
-              <a:t>Quarter” </a:t>
+              <a:rPr lang="en-US" dirty="0"/>
+              <a:t>"The Rain Song," "No Quarter” </a:t>
             </a:r>
           </a:p>
           <a:p>
             <a:pPr lvl="1"/>
             <a:r>
-              <a:rPr lang="en-US" dirty="0" smtClean="0"/>
-              <a:t>“</a:t>
-            </a:r>
-            <a:r>
-              <a:rPr lang="en-US" dirty="0"/>
-              <a:t>Over the Hills and Far </a:t>
-            </a:r>
-            <a:r>
-              <a:rPr lang="en-US" dirty="0" smtClean="0"/>
-              <a:t>Away” </a:t>
+              <a:rPr lang="en-US" dirty="0"/>
+              <a:t>“Over the Hills and Far Away” </a:t>
             </a:r>
           </a:p>
           <a:p>
             <a:pPr lvl="1"/>
             <a:r>
-              <a:rPr lang="en-US" dirty="0" smtClean="0"/>
+              <a:rPr lang="en-US" dirty="0"/>
               <a:t>"</a:t>
             </a:r>
             <a:r>
@@ -3859,11 +3730,11 @@
               <a:t> </a:t>
             </a:r>
             <a:r>
-              <a:rPr lang="en-US" dirty="0" err="1" smtClean="0"/>
+              <a:rPr lang="en-US" dirty="0" err="1"/>
               <a:t>Mak'er</a:t>
             </a:r>
             <a:r>
-              <a:rPr lang="en-US" dirty="0" smtClean="0"/>
+              <a:rPr lang="en-US" dirty="0"/>
               <a:t>“</a:t>
             </a:r>
           </a:p>
@@ -3873,33 +3744,23 @@
               <a:rPr lang="en-US" dirty="0">
                 <a:hlinkClick r:id="rId2"/>
               </a:rPr>
-              <a:t>https://</a:t>
-            </a:r>
-            <a:r>
-              <a:rPr lang="en-US" dirty="0" smtClean="0">
-                <a:hlinkClick r:id="rId2"/>
-              </a:rPr>
-              <a:t>www.youtube.com/watch?v=LTYLz49ALhE</a:t>
+              <a:t>https://www.youtube.com/watch?v=LTYLz49ALhE</a:t>
             </a:r>
             <a:endParaRPr lang="en-US" dirty="0"/>
           </a:p>
           <a:p>
             <a:r>
               <a:rPr lang="en-US" i="1" dirty="0"/>
-              <a:t>Physical </a:t>
-            </a:r>
-            <a:r>
-              <a:rPr lang="en-US" i="1" dirty="0" smtClean="0"/>
-              <a:t>Graffiti </a:t>
-            </a:r>
-            <a:r>
-              <a:rPr lang="en-US" dirty="0" smtClean="0"/>
+              <a:t>Physical Graffiti </a:t>
+            </a:r>
+            <a:r>
+              <a:rPr lang="en-US" dirty="0"/>
               <a:t>(1975):</a:t>
             </a:r>
           </a:p>
           <a:p>
             <a:r>
-              <a:rPr lang="en-US" dirty="0" smtClean="0"/>
+              <a:rPr lang="en-US" dirty="0"/>
               <a:t>“Trampled Underfoot”</a:t>
             </a:r>
           </a:p>
@@ -3908,15 +3769,9 @@
               <a:rPr lang="en-US" dirty="0">
                 <a:hlinkClick r:id="rId3"/>
               </a:rPr>
-              <a:t>https://</a:t>
-            </a:r>
-            <a:r>
-              <a:rPr lang="en-US" dirty="0" smtClean="0">
-                <a:hlinkClick r:id="rId3"/>
-              </a:rPr>
-              <a:t>www.youtube.com/watch?v=TZsqcXHuLWU</a:t>
-            </a:r>
-            <a:endParaRPr lang="en-US" dirty="0" smtClean="0"/>
+              <a:t>https://www.youtube.com/watch?v=TZsqcXHuLWU</a:t>
+            </a:r>
+            <a:endParaRPr lang="en-US" dirty="0"/>
           </a:p>
           <a:p>
             <a:endParaRPr lang="en-US" dirty="0"/>
@@ -3999,13 +3854,6 @@
   <p:clrMapOvr>
     <a:masterClrMapping/>
   </p:clrMapOvr>
-  <p:timing>
-    <p:tnLst>
-      <p:par>
-        <p:cTn id="1" dur="indefinite" restart="never" nodeType="tmRoot"/>
-      </p:par>
-    </p:tnLst>
-  </p:timing>
 </p:sld>
 </file>
 
@@ -4044,14 +3892,11 @@
           <a:lstStyle/>
           <a:p>
             <a:r>
-              <a:rPr lang="en-US" sz="6000" dirty="0" smtClean="0">
+              <a:rPr lang="en-US" sz="6000" dirty="0">
                 <a:latin typeface="Algerian" panose="04020705040A02060702" pitchFamily="82" charset="0"/>
               </a:rPr>
               <a:t>The END, 1980</a:t>
             </a:r>
-            <a:endParaRPr lang="en-US" sz="6000" dirty="0">
-              <a:latin typeface="Algerian" panose="04020705040A02060702" pitchFamily="82" charset="0"/>
-            </a:endParaRPr>
           </a:p>
         </p:txBody>
       </p:sp>
@@ -4078,55 +3923,55 @@
           <a:lstStyle/>
           <a:p>
             <a:r>
-              <a:rPr lang="en-US" dirty="0" smtClean="0"/>
+              <a:rPr lang="en-US" dirty="0"/>
               <a:t>Toured less as the decade went on.</a:t>
             </a:r>
           </a:p>
           <a:p>
             <a:r>
-              <a:rPr lang="en-US" dirty="0" smtClean="0"/>
+              <a:rPr lang="en-US" dirty="0"/>
               <a:t>Robert Plant and wife Maureen in car accident, Rhodes, 1975</a:t>
             </a:r>
           </a:p>
           <a:p>
             <a:r>
-              <a:rPr lang="en-US" dirty="0" smtClean="0"/>
+              <a:rPr lang="en-US" dirty="0"/>
               <a:t>July 1977: Plant’s son </a:t>
             </a:r>
             <a:r>
-              <a:rPr lang="en-US" dirty="0" err="1" smtClean="0"/>
+              <a:rPr lang="en-US" dirty="0" err="1"/>
               <a:t>Karac</a:t>
             </a:r>
             <a:r>
-              <a:rPr lang="en-US" dirty="0" smtClean="0"/>
+              <a:rPr lang="en-US" dirty="0"/>
               <a:t> died at age five, while he was away on tour.</a:t>
             </a:r>
           </a:p>
           <a:p>
             <a:r>
-              <a:rPr lang="en-US" dirty="0" smtClean="0"/>
+              <a:rPr lang="en-US" dirty="0"/>
               <a:t>Last big album: </a:t>
             </a:r>
             <a:r>
-              <a:rPr lang="en-US" i="1" dirty="0" smtClean="0"/>
+              <a:rPr lang="en-US" i="1" dirty="0"/>
               <a:t>In Through the Out Door </a:t>
             </a:r>
             <a:r>
-              <a:rPr lang="en-US" dirty="0" smtClean="0"/>
+              <a:rPr lang="en-US" dirty="0"/>
               <a:t>(1979):</a:t>
             </a:r>
           </a:p>
           <a:p>
             <a:pPr lvl="1"/>
             <a:r>
-              <a:rPr lang="en-US" dirty="0" smtClean="0"/>
+              <a:rPr lang="en-US" dirty="0"/>
               <a:t>“Fool in the Rain”</a:t>
             </a:r>
           </a:p>
           <a:p>
             <a:pPr lvl="1"/>
             <a:r>
-              <a:rPr lang="en-US" dirty="0" smtClean="0"/>
+              <a:rPr lang="en-US" dirty="0"/>
               <a:t>“All of My Love”</a:t>
             </a:r>
           </a:p>
@@ -4136,28 +3981,22 @@
               <a:rPr lang="en-US" dirty="0">
                 <a:hlinkClick r:id="rId2"/>
               </a:rPr>
-              <a:t>https://</a:t>
-            </a:r>
-            <a:r>
-              <a:rPr lang="en-US" dirty="0" smtClean="0">
-                <a:hlinkClick r:id="rId2"/>
-              </a:rPr>
-              <a:t>www.youtube.com/watch?v=zeVz5R2lDQk</a:t>
-            </a:r>
-            <a:endParaRPr lang="en-US" dirty="0" smtClean="0"/>
-          </a:p>
-          <a:p>
-            <a:r>
-              <a:rPr lang="en-US" dirty="0" smtClean="0"/>
+              <a:t>https://www.youtube.com/watch?v=-NoMn5tRlAg</a:t>
+            </a:r>
+            <a:endParaRPr lang="en-US" dirty="0"/>
+          </a:p>
+          <a:p>
+            <a:pPr lvl="1"/>
+            <a:r>
+              <a:rPr lang="en-US" dirty="0"/>
               <a:t>September 1980: John Bonham died</a:t>
             </a:r>
           </a:p>
           <a:p>
             <a:r>
-              <a:rPr lang="en-US" dirty="0" smtClean="0"/>
+              <a:rPr lang="en-US" dirty="0"/>
               <a:t>Band decided not to continue.</a:t>
             </a:r>
-            <a:endParaRPr lang="en-US" dirty="0"/>
           </a:p>
         </p:txBody>
       </p:sp>
@@ -4237,13 +4076,6 @@
   <p:clrMapOvr>
     <a:masterClrMapping/>
   </p:clrMapOvr>
-  <p:timing>
-    <p:tnLst>
-      <p:par>
-        <p:cTn id="1" dur="indefinite" restart="never" nodeType="tmRoot"/>
-      </p:par>
-    </p:tnLst>
-  </p:timing>
 </p:sld>
 </file>
 

</xml_diff>